<commit_message>
Fixed some small errors, added a few notes.
</commit_message>
<xml_diff>
--- a/Modules/10-Chef_Intermediate.pptx
+++ b/Modules/10-Chef_Intermediate.pptx
@@ -4,6 +4,9 @@
   <p:sldMasterIdLst>
     <p:sldMasterId id="2147483648" r:id="rId1"/>
   </p:sldMasterIdLst>
+  <p:notesMasterIdLst>
+    <p:notesMasterId r:id="rId14"/>
+  </p:notesMasterIdLst>
   <p:sldIdLst>
     <p:sldId id="547" r:id="rId2"/>
     <p:sldId id="548" r:id="rId3"/>
@@ -117,7 +120,7 @@
   </p:defaultTextStyle>
   <p:extLst>
     <p:ext uri="{EFAFB233-063F-42B5-8137-9DF3F51BA10A}">
-      <p15:sldGuideLst xmlns:p15="http://schemas.microsoft.com/office/powerpoint/2012/main">
+      <p15:sldGuideLst xmlns="" xmlns:p15="http://schemas.microsoft.com/office/powerpoint/2012/main">
         <p15:guide id="1" orient="horz" pos="2880">
           <p15:clr>
             <a:srgbClr val="A4A3A4"/>
@@ -132,6 +135,636 @@
     </p:ext>
   </p:extLst>
 </p:presentation>
+</file>
+
+<file path=ppt/notesMasters/notesMaster1.xml><?xml version="1.0" encoding="utf-8"?>
+<p:notesMaster xmlns:a="http://schemas.openxmlformats.org/drawingml/2006/main" xmlns:r="http://schemas.openxmlformats.org/officeDocument/2006/relationships" xmlns:p="http://schemas.openxmlformats.org/presentationml/2006/main">
+  <p:cSld>
+    <p:bg>
+      <p:bgRef idx="1001">
+        <a:schemeClr val="bg1"/>
+      </p:bgRef>
+    </p:bg>
+    <p:spTree>
+      <p:nvGrpSpPr>
+        <p:cNvPr id="1" name=""/>
+        <p:cNvGrpSpPr/>
+        <p:nvPr/>
+      </p:nvGrpSpPr>
+      <p:grpSpPr>
+        <a:xfrm>
+          <a:off x="0" y="0"/>
+          <a:ext cx="0" cy="0"/>
+          <a:chOff x="0" y="0"/>
+          <a:chExt cx="0" cy="0"/>
+        </a:xfrm>
+      </p:grpSpPr>
+      <p:sp>
+        <p:nvSpPr>
+          <p:cNvPr id="2" name="Header Placeholder 1"/>
+          <p:cNvSpPr>
+            <a:spLocks noGrp="1"/>
+          </p:cNvSpPr>
+          <p:nvPr>
+            <p:ph type="hdr" sz="quarter"/>
+          </p:nvPr>
+        </p:nvSpPr>
+        <p:spPr>
+          <a:xfrm>
+            <a:off x="0" y="0"/>
+            <a:ext cx="7043738" cy="457200"/>
+          </a:xfrm>
+          <a:prstGeom prst="rect">
+            <a:avLst/>
+          </a:prstGeom>
+        </p:spPr>
+        <p:txBody>
+          <a:bodyPr vert="horz" lIns="91440" tIns="45720" rIns="91440" bIns="45720" rtlCol="0"/>
+          <a:lstStyle>
+            <a:lvl1pPr algn="l">
+              <a:defRPr sz="1200"/>
+            </a:lvl1pPr>
+          </a:lstStyle>
+          <a:p>
+            <a:endParaRPr lang="en-US"/>
+          </a:p>
+        </p:txBody>
+      </p:sp>
+      <p:sp>
+        <p:nvSpPr>
+          <p:cNvPr id="3" name="Date Placeholder 2"/>
+          <p:cNvSpPr>
+            <a:spLocks noGrp="1"/>
+          </p:cNvSpPr>
+          <p:nvPr>
+            <p:ph type="dt" idx="1"/>
+          </p:nvPr>
+        </p:nvSpPr>
+        <p:spPr>
+          <a:xfrm>
+            <a:off x="9207500" y="0"/>
+            <a:ext cx="7045325" cy="457200"/>
+          </a:xfrm>
+          <a:prstGeom prst="rect">
+            <a:avLst/>
+          </a:prstGeom>
+        </p:spPr>
+        <p:txBody>
+          <a:bodyPr vert="horz" lIns="91440" tIns="45720" rIns="91440" bIns="45720" rtlCol="0"/>
+          <a:lstStyle>
+            <a:lvl1pPr algn="r">
+              <a:defRPr sz="1200"/>
+            </a:lvl1pPr>
+          </a:lstStyle>
+          <a:p>
+            <a:fld id="{9AF33057-6D84-D14E-AD32-9E8926ACCADD}" type="datetimeFigureOut">
+              <a:rPr lang="en-US" smtClean="0"/>
+              <a:t>6/19/15</a:t>
+            </a:fld>
+            <a:endParaRPr lang="en-US"/>
+          </a:p>
+        </p:txBody>
+      </p:sp>
+      <p:sp>
+        <p:nvSpPr>
+          <p:cNvPr id="4" name="Slide Image Placeholder 3"/>
+          <p:cNvSpPr>
+            <a:spLocks noGrp="1" noRot="1" noChangeAspect="1"/>
+          </p:cNvSpPr>
+          <p:nvPr>
+            <p:ph type="sldImg" idx="2"/>
+          </p:nvPr>
+        </p:nvSpPr>
+        <p:spPr>
+          <a:xfrm>
+            <a:off x="5080000" y="685800"/>
+            <a:ext cx="6096000" cy="3429000"/>
+          </a:xfrm>
+          <a:prstGeom prst="rect">
+            <a:avLst/>
+          </a:prstGeom>
+          <a:noFill/>
+          <a:ln w="12700">
+            <a:solidFill>
+              <a:prstClr val="black"/>
+            </a:solidFill>
+          </a:ln>
+        </p:spPr>
+        <p:txBody>
+          <a:bodyPr vert="horz" lIns="91440" tIns="45720" rIns="91440" bIns="45720" rtlCol="0" anchor="ctr"/>
+          <a:lstStyle/>
+          <a:p>
+            <a:endParaRPr lang="en-US"/>
+          </a:p>
+        </p:txBody>
+      </p:sp>
+      <p:sp>
+        <p:nvSpPr>
+          <p:cNvPr id="5" name="Notes Placeholder 4"/>
+          <p:cNvSpPr>
+            <a:spLocks noGrp="1"/>
+          </p:cNvSpPr>
+          <p:nvPr>
+            <p:ph type="body" sz="quarter" idx="3"/>
+          </p:nvPr>
+        </p:nvSpPr>
+        <p:spPr>
+          <a:xfrm>
+            <a:off x="1625600" y="4343400"/>
+            <a:ext cx="13004800" cy="4114800"/>
+          </a:xfrm>
+          <a:prstGeom prst="rect">
+            <a:avLst/>
+          </a:prstGeom>
+        </p:spPr>
+        <p:txBody>
+          <a:bodyPr vert="horz" lIns="91440" tIns="45720" rIns="91440" bIns="45720" rtlCol="0"/>
+          <a:lstStyle/>
+          <a:p>
+            <a:pPr lvl="0"/>
+            <a:r>
+              <a:rPr lang="en-US" smtClean="0"/>
+              <a:t>Click to edit Master text styles</a:t>
+            </a:r>
+          </a:p>
+          <a:p>
+            <a:pPr lvl="1"/>
+            <a:r>
+              <a:rPr lang="en-US" smtClean="0"/>
+              <a:t>Second level</a:t>
+            </a:r>
+          </a:p>
+          <a:p>
+            <a:pPr lvl="2"/>
+            <a:r>
+              <a:rPr lang="en-US" smtClean="0"/>
+              <a:t>Third level</a:t>
+            </a:r>
+          </a:p>
+          <a:p>
+            <a:pPr lvl="3"/>
+            <a:r>
+              <a:rPr lang="en-US" smtClean="0"/>
+              <a:t>Fourth level</a:t>
+            </a:r>
+          </a:p>
+          <a:p>
+            <a:pPr lvl="4"/>
+            <a:r>
+              <a:rPr lang="en-US" smtClean="0"/>
+              <a:t>Fifth level</a:t>
+            </a:r>
+            <a:endParaRPr lang="en-US"/>
+          </a:p>
+        </p:txBody>
+      </p:sp>
+      <p:sp>
+        <p:nvSpPr>
+          <p:cNvPr id="6" name="Footer Placeholder 5"/>
+          <p:cNvSpPr>
+            <a:spLocks noGrp="1"/>
+          </p:cNvSpPr>
+          <p:nvPr>
+            <p:ph type="ftr" sz="quarter" idx="4"/>
+          </p:nvPr>
+        </p:nvSpPr>
+        <p:spPr>
+          <a:xfrm>
+            <a:off x="0" y="8685213"/>
+            <a:ext cx="7043738" cy="457200"/>
+          </a:xfrm>
+          <a:prstGeom prst="rect">
+            <a:avLst/>
+          </a:prstGeom>
+        </p:spPr>
+        <p:txBody>
+          <a:bodyPr vert="horz" lIns="91440" tIns="45720" rIns="91440" bIns="45720" rtlCol="0" anchor="b"/>
+          <a:lstStyle>
+            <a:lvl1pPr algn="l">
+              <a:defRPr sz="1200"/>
+            </a:lvl1pPr>
+          </a:lstStyle>
+          <a:p>
+            <a:endParaRPr lang="en-US"/>
+          </a:p>
+        </p:txBody>
+      </p:sp>
+      <p:sp>
+        <p:nvSpPr>
+          <p:cNvPr id="7" name="Slide Number Placeholder 6"/>
+          <p:cNvSpPr>
+            <a:spLocks noGrp="1"/>
+          </p:cNvSpPr>
+          <p:nvPr>
+            <p:ph type="sldNum" sz="quarter" idx="5"/>
+          </p:nvPr>
+        </p:nvSpPr>
+        <p:spPr>
+          <a:xfrm>
+            <a:off x="9207500" y="8685213"/>
+            <a:ext cx="7045325" cy="457200"/>
+          </a:xfrm>
+          <a:prstGeom prst="rect">
+            <a:avLst/>
+          </a:prstGeom>
+        </p:spPr>
+        <p:txBody>
+          <a:bodyPr vert="horz" lIns="91440" tIns="45720" rIns="91440" bIns="45720" rtlCol="0" anchor="b"/>
+          <a:lstStyle>
+            <a:lvl1pPr algn="r">
+              <a:defRPr sz="1200"/>
+            </a:lvl1pPr>
+          </a:lstStyle>
+          <a:p>
+            <a:fld id="{458270A1-F167-1041-AC6D-20F4E2C0DE9C}" type="slidenum">
+              <a:rPr lang="en-US" smtClean="0"/>
+              <a:t>‹#›</a:t>
+            </a:fld>
+            <a:endParaRPr lang="en-US"/>
+          </a:p>
+        </p:txBody>
+      </p:sp>
+    </p:spTree>
+    <p:extLst>
+      <p:ext uri="{BB962C8B-B14F-4D97-AF65-F5344CB8AC3E}">
+        <p14:creationId xmlns:p14="http://schemas.microsoft.com/office/powerpoint/2010/main" val="208955241"/>
+      </p:ext>
+    </p:extLst>
+  </p:cSld>
+  <p:clrMap bg1="lt1" tx1="dk1" bg2="lt2" tx2="dk2" accent1="accent1" accent2="accent2" accent3="accent3" accent4="accent4" accent5="accent5" accent6="accent6" hlink="hlink" folHlink="folHlink"/>
+  <p:notesStyle>
+    <a:lvl1pPr marL="0" algn="l" defTabSz="457200" rtl="0" eaLnBrk="1" latinLnBrk="0" hangingPunct="1">
+      <a:defRPr sz="1200" kern="1200">
+        <a:solidFill>
+          <a:schemeClr val="tx1"/>
+        </a:solidFill>
+        <a:latin typeface="+mn-lt"/>
+        <a:ea typeface="+mn-ea"/>
+        <a:cs typeface="+mn-cs"/>
+      </a:defRPr>
+    </a:lvl1pPr>
+    <a:lvl2pPr marL="457200" algn="l" defTabSz="457200" rtl="0" eaLnBrk="1" latinLnBrk="0" hangingPunct="1">
+      <a:defRPr sz="1200" kern="1200">
+        <a:solidFill>
+          <a:schemeClr val="tx1"/>
+        </a:solidFill>
+        <a:latin typeface="+mn-lt"/>
+        <a:ea typeface="+mn-ea"/>
+        <a:cs typeface="+mn-cs"/>
+      </a:defRPr>
+    </a:lvl2pPr>
+    <a:lvl3pPr marL="914400" algn="l" defTabSz="457200" rtl="0" eaLnBrk="1" latinLnBrk="0" hangingPunct="1">
+      <a:defRPr sz="1200" kern="1200">
+        <a:solidFill>
+          <a:schemeClr val="tx1"/>
+        </a:solidFill>
+        <a:latin typeface="+mn-lt"/>
+        <a:ea typeface="+mn-ea"/>
+        <a:cs typeface="+mn-cs"/>
+      </a:defRPr>
+    </a:lvl3pPr>
+    <a:lvl4pPr marL="1371600" algn="l" defTabSz="457200" rtl="0" eaLnBrk="1" latinLnBrk="0" hangingPunct="1">
+      <a:defRPr sz="1200" kern="1200">
+        <a:solidFill>
+          <a:schemeClr val="tx1"/>
+        </a:solidFill>
+        <a:latin typeface="+mn-lt"/>
+        <a:ea typeface="+mn-ea"/>
+        <a:cs typeface="+mn-cs"/>
+      </a:defRPr>
+    </a:lvl4pPr>
+    <a:lvl5pPr marL="1828800" algn="l" defTabSz="457200" rtl="0" eaLnBrk="1" latinLnBrk="0" hangingPunct="1">
+      <a:defRPr sz="1200" kern="1200">
+        <a:solidFill>
+          <a:schemeClr val="tx1"/>
+        </a:solidFill>
+        <a:latin typeface="+mn-lt"/>
+        <a:ea typeface="+mn-ea"/>
+        <a:cs typeface="+mn-cs"/>
+      </a:defRPr>
+    </a:lvl5pPr>
+    <a:lvl6pPr marL="2286000" algn="l" defTabSz="457200" rtl="0" eaLnBrk="1" latinLnBrk="0" hangingPunct="1">
+      <a:defRPr sz="1200" kern="1200">
+        <a:solidFill>
+          <a:schemeClr val="tx1"/>
+        </a:solidFill>
+        <a:latin typeface="+mn-lt"/>
+        <a:ea typeface="+mn-ea"/>
+        <a:cs typeface="+mn-cs"/>
+      </a:defRPr>
+    </a:lvl6pPr>
+    <a:lvl7pPr marL="2743200" algn="l" defTabSz="457200" rtl="0" eaLnBrk="1" latinLnBrk="0" hangingPunct="1">
+      <a:defRPr sz="1200" kern="1200">
+        <a:solidFill>
+          <a:schemeClr val="tx1"/>
+        </a:solidFill>
+        <a:latin typeface="+mn-lt"/>
+        <a:ea typeface="+mn-ea"/>
+        <a:cs typeface="+mn-cs"/>
+      </a:defRPr>
+    </a:lvl7pPr>
+    <a:lvl8pPr marL="3200400" algn="l" defTabSz="457200" rtl="0" eaLnBrk="1" latinLnBrk="0" hangingPunct="1">
+      <a:defRPr sz="1200" kern="1200">
+        <a:solidFill>
+          <a:schemeClr val="tx1"/>
+        </a:solidFill>
+        <a:latin typeface="+mn-lt"/>
+        <a:ea typeface="+mn-ea"/>
+        <a:cs typeface="+mn-cs"/>
+      </a:defRPr>
+    </a:lvl8pPr>
+    <a:lvl9pPr marL="3657600" algn="l" defTabSz="457200" rtl="0" eaLnBrk="1" latinLnBrk="0" hangingPunct="1">
+      <a:defRPr sz="1200" kern="1200">
+        <a:solidFill>
+          <a:schemeClr val="tx1"/>
+        </a:solidFill>
+        <a:latin typeface="+mn-lt"/>
+        <a:ea typeface="+mn-ea"/>
+        <a:cs typeface="+mn-cs"/>
+      </a:defRPr>
+    </a:lvl9pPr>
+  </p:notesStyle>
+</p:notesMaster>
+</file>
+
+<file path=ppt/notesSlides/notesSlide1.xml><?xml version="1.0" encoding="utf-8"?>
+<p:notes xmlns:a="http://schemas.openxmlformats.org/drawingml/2006/main" xmlns:r="http://schemas.openxmlformats.org/officeDocument/2006/relationships" xmlns:p="http://schemas.openxmlformats.org/presentationml/2006/main">
+  <p:cSld>
+    <p:spTree>
+      <p:nvGrpSpPr>
+        <p:cNvPr id="1" name=""/>
+        <p:cNvGrpSpPr/>
+        <p:nvPr/>
+      </p:nvGrpSpPr>
+      <p:grpSpPr>
+        <a:xfrm>
+          <a:off x="0" y="0"/>
+          <a:ext cx="0" cy="0"/>
+          <a:chOff x="0" y="0"/>
+          <a:chExt cx="0" cy="0"/>
+        </a:xfrm>
+      </p:grpSpPr>
+      <p:sp>
+        <p:nvSpPr>
+          <p:cNvPr id="2" name="Slide Image Placeholder 1"/>
+          <p:cNvSpPr>
+            <a:spLocks noGrp="1" noRot="1" noChangeAspect="1"/>
+          </p:cNvSpPr>
+          <p:nvPr>
+            <p:ph type="sldImg"/>
+          </p:nvPr>
+        </p:nvSpPr>
+        <p:spPr/>
+      </p:sp>
+      <p:sp>
+        <p:nvSpPr>
+          <p:cNvPr id="3" name="Notes Placeholder 2"/>
+          <p:cNvSpPr>
+            <a:spLocks noGrp="1"/>
+          </p:cNvSpPr>
+          <p:nvPr>
+            <p:ph type="body" idx="1"/>
+          </p:nvPr>
+        </p:nvSpPr>
+        <p:spPr/>
+        <p:txBody>
+          <a:bodyPr/>
+          <a:lstStyle/>
+          <a:p>
+            <a:endParaRPr lang="en-US" dirty="0"/>
+          </a:p>
+        </p:txBody>
+      </p:sp>
+      <p:sp>
+        <p:nvSpPr>
+          <p:cNvPr id="4" name="Slide Number Placeholder 3"/>
+          <p:cNvSpPr>
+            <a:spLocks noGrp="1"/>
+          </p:cNvSpPr>
+          <p:nvPr>
+            <p:ph type="sldNum" sz="quarter" idx="10"/>
+          </p:nvPr>
+        </p:nvSpPr>
+        <p:spPr/>
+        <p:txBody>
+          <a:bodyPr/>
+          <a:lstStyle/>
+          <a:p>
+            <a:fld id="{458270A1-F167-1041-AC6D-20F4E2C0DE9C}" type="slidenum">
+              <a:rPr lang="en-US" smtClean="0"/>
+              <a:t>2</a:t>
+            </a:fld>
+            <a:endParaRPr lang="en-US"/>
+          </a:p>
+        </p:txBody>
+      </p:sp>
+    </p:spTree>
+    <p:extLst>
+      <p:ext uri="{BB962C8B-B14F-4D97-AF65-F5344CB8AC3E}">
+        <p14:creationId xmlns:p14="http://schemas.microsoft.com/office/powerpoint/2010/main" val="1029325645"/>
+      </p:ext>
+    </p:extLst>
+  </p:cSld>
+  <p:clrMapOvr>
+    <a:masterClrMapping/>
+  </p:clrMapOvr>
+</p:notes>
+</file>
+
+<file path=ppt/notesSlides/notesSlide2.xml><?xml version="1.0" encoding="utf-8"?>
+<p:notes xmlns:a="http://schemas.openxmlformats.org/drawingml/2006/main" xmlns:r="http://schemas.openxmlformats.org/officeDocument/2006/relationships" xmlns:p="http://schemas.openxmlformats.org/presentationml/2006/main">
+  <p:cSld>
+    <p:spTree>
+      <p:nvGrpSpPr>
+        <p:cNvPr id="1" name=""/>
+        <p:cNvGrpSpPr/>
+        <p:nvPr/>
+      </p:nvGrpSpPr>
+      <p:grpSpPr>
+        <a:xfrm>
+          <a:off x="0" y="0"/>
+          <a:ext cx="0" cy="0"/>
+          <a:chOff x="0" y="0"/>
+          <a:chExt cx="0" cy="0"/>
+        </a:xfrm>
+      </p:grpSpPr>
+      <p:sp>
+        <p:nvSpPr>
+          <p:cNvPr id="2" name="Slide Image Placeholder 1"/>
+          <p:cNvSpPr>
+            <a:spLocks noGrp="1" noRot="1" noChangeAspect="1"/>
+          </p:cNvSpPr>
+          <p:nvPr>
+            <p:ph type="sldImg"/>
+          </p:nvPr>
+        </p:nvSpPr>
+        <p:spPr/>
+      </p:sp>
+      <p:sp>
+        <p:nvSpPr>
+          <p:cNvPr id="3" name="Notes Placeholder 2"/>
+          <p:cNvSpPr>
+            <a:spLocks noGrp="1"/>
+          </p:cNvSpPr>
+          <p:nvPr>
+            <p:ph type="body" idx="1"/>
+          </p:nvPr>
+        </p:nvSpPr>
+        <p:spPr/>
+        <p:txBody>
+          <a:bodyPr/>
+          <a:lstStyle/>
+          <a:p>
+            <a:r>
+              <a:rPr lang="en-US" dirty="0" smtClean="0"/>
+              <a:t>If you are using the </a:t>
+            </a:r>
+            <a:r>
+              <a:rPr lang="en-US" dirty="0" err="1" smtClean="0"/>
+              <a:t>ChefDK</a:t>
+            </a:r>
+            <a:r>
+              <a:rPr lang="en-US" dirty="0" smtClean="0"/>
+              <a:t>, </a:t>
+            </a:r>
+            <a:r>
+              <a:rPr lang="en-US" dirty="0" smtClean="0"/>
+              <a:t>you already have </a:t>
+            </a:r>
+            <a:r>
+              <a:rPr lang="en-US" dirty="0" err="1" smtClean="0"/>
+              <a:t>foodcritic</a:t>
+            </a:r>
+            <a:r>
+              <a:rPr lang="en-US" smtClean="0"/>
+              <a:t> installed!</a:t>
+            </a:r>
+            <a:endParaRPr lang="en-US" dirty="0"/>
+          </a:p>
+        </p:txBody>
+      </p:sp>
+      <p:sp>
+        <p:nvSpPr>
+          <p:cNvPr id="4" name="Slide Number Placeholder 3"/>
+          <p:cNvSpPr>
+            <a:spLocks noGrp="1"/>
+          </p:cNvSpPr>
+          <p:nvPr>
+            <p:ph type="sldNum" sz="quarter" idx="10"/>
+          </p:nvPr>
+        </p:nvSpPr>
+        <p:spPr/>
+        <p:txBody>
+          <a:bodyPr/>
+          <a:lstStyle/>
+          <a:p>
+            <a:fld id="{458270A1-F167-1041-AC6D-20F4E2C0DE9C}" type="slidenum">
+              <a:rPr lang="en-US" smtClean="0"/>
+              <a:t>7</a:t>
+            </a:fld>
+            <a:endParaRPr lang="en-US"/>
+          </a:p>
+        </p:txBody>
+      </p:sp>
+    </p:spTree>
+    <p:extLst>
+      <p:ext uri="{BB962C8B-B14F-4D97-AF65-F5344CB8AC3E}">
+        <p14:creationId xmlns:p14="http://schemas.microsoft.com/office/powerpoint/2010/main" val="502392060"/>
+      </p:ext>
+    </p:extLst>
+  </p:cSld>
+  <p:clrMapOvr>
+    <a:masterClrMapping/>
+  </p:clrMapOvr>
+</p:notes>
+</file>
+
+<file path=ppt/notesSlides/notesSlide3.xml><?xml version="1.0" encoding="utf-8"?>
+<p:notes xmlns:a="http://schemas.openxmlformats.org/drawingml/2006/main" xmlns:r="http://schemas.openxmlformats.org/officeDocument/2006/relationships" xmlns:p="http://schemas.openxmlformats.org/presentationml/2006/main">
+  <p:cSld>
+    <p:spTree>
+      <p:nvGrpSpPr>
+        <p:cNvPr id="1" name=""/>
+        <p:cNvGrpSpPr/>
+        <p:nvPr/>
+      </p:nvGrpSpPr>
+      <p:grpSpPr>
+        <a:xfrm>
+          <a:off x="0" y="0"/>
+          <a:ext cx="0" cy="0"/>
+          <a:chOff x="0" y="0"/>
+          <a:chExt cx="0" cy="0"/>
+        </a:xfrm>
+      </p:grpSpPr>
+      <p:sp>
+        <p:nvSpPr>
+          <p:cNvPr id="2" name="Slide Image Placeholder 1"/>
+          <p:cNvSpPr>
+            <a:spLocks noGrp="1" noRot="1" noChangeAspect="1"/>
+          </p:cNvSpPr>
+          <p:nvPr>
+            <p:ph type="sldImg"/>
+          </p:nvPr>
+        </p:nvSpPr>
+        <p:spPr/>
+      </p:sp>
+      <p:sp>
+        <p:nvSpPr>
+          <p:cNvPr id="3" name="Notes Placeholder 2"/>
+          <p:cNvSpPr>
+            <a:spLocks noGrp="1"/>
+          </p:cNvSpPr>
+          <p:nvPr>
+            <p:ph type="body" idx="1"/>
+          </p:nvPr>
+        </p:nvSpPr>
+        <p:spPr/>
+        <p:txBody>
+          <a:bodyPr/>
+          <a:lstStyle/>
+          <a:p>
+            <a:r>
+              <a:rPr lang="en-US" dirty="0" smtClean="0"/>
+              <a:t>The tilde means to ignore this rule.</a:t>
+            </a:r>
+            <a:endParaRPr lang="en-US" dirty="0"/>
+          </a:p>
+        </p:txBody>
+      </p:sp>
+      <p:sp>
+        <p:nvSpPr>
+          <p:cNvPr id="4" name="Slide Number Placeholder 3"/>
+          <p:cNvSpPr>
+            <a:spLocks noGrp="1"/>
+          </p:cNvSpPr>
+          <p:nvPr>
+            <p:ph type="sldNum" sz="quarter" idx="10"/>
+          </p:nvPr>
+        </p:nvSpPr>
+        <p:spPr/>
+        <p:txBody>
+          <a:bodyPr/>
+          <a:lstStyle/>
+          <a:p>
+            <a:fld id="{458270A1-F167-1041-AC6D-20F4E2C0DE9C}" type="slidenum">
+              <a:rPr lang="en-US" smtClean="0"/>
+              <a:t>9</a:t>
+            </a:fld>
+            <a:endParaRPr lang="en-US"/>
+          </a:p>
+        </p:txBody>
+      </p:sp>
+    </p:spTree>
+    <p:extLst>
+      <p:ext uri="{BB962C8B-B14F-4D97-AF65-F5344CB8AC3E}">
+        <p14:creationId xmlns:p14="http://schemas.microsoft.com/office/powerpoint/2010/main" val="3809549308"/>
+      </p:ext>
+    </p:extLst>
+  </p:cSld>
+  <p:clrMapOvr>
+    <a:masterClrMapping/>
+  </p:clrMapOvr>
+</p:notes>
 </file>
 
 <file path=ppt/slideLayouts/slideLayout1.xml><?xml version="1.0" encoding="utf-8"?>
@@ -273,7 +906,7 @@
           <a:p>
             <a:fld id="{1D8BD707-D9CF-40AE-B4C6-C98DA3205C09}" type="datetimeFigureOut">
               <a:rPr lang="en-US"/>
-              <a:t>6/5/2015</a:t>
+              <a:t>6/19/15</a:t>
             </a:fld>
             <a:endParaRPr lang="en-US"/>
           </a:p>
@@ -456,7 +1089,7 @@
           <a:p>
             <a:fld id="{1D8BD707-D9CF-40AE-B4C6-C98DA3205C09}" type="datetimeFigureOut">
               <a:rPr lang="en-US"/>
-              <a:t>6/5/2015</a:t>
+              <a:t>6/19/15</a:t>
             </a:fld>
             <a:endParaRPr lang="en-US"/>
           </a:p>
@@ -3701,7 +4334,7 @@
           <a:p>
             <a:fld id="{1D8BD707-D9CF-40AE-B4C6-C98DA3205C09}" type="datetimeFigureOut">
               <a:rPr lang="en-US"/>
-              <a:t>6/5/2015</a:t>
+              <a:t>6/19/15</a:t>
             </a:fld>
             <a:endParaRPr lang="en-US"/>
           </a:p>
@@ -3855,7 +4488,7 @@
           <a:p>
             <a:fld id="{1D8BD707-D9CF-40AE-B4C6-C98DA3205C09}" type="datetimeFigureOut">
               <a:rPr lang="en-US"/>
-              <a:t>6/5/2015</a:t>
+              <a:t>6/19/15</a:t>
             </a:fld>
             <a:endParaRPr lang="en-US"/>
           </a:p>
@@ -7028,7 +7661,7 @@
           <a:p>
             <a:fld id="{1D8BD707-D9CF-40AE-B4C6-C98DA3205C09}" type="datetimeFigureOut">
               <a:rPr lang="en-US"/>
-              <a:t>6/5/2015</a:t>
+              <a:t>6/19/15</a:t>
             </a:fld>
             <a:endParaRPr lang="en-US"/>
           </a:p>
@@ -7309,7 +7942,7 @@
           <a:p>
             <a:fld id="{1D8BD707-D9CF-40AE-B4C6-C98DA3205C09}" type="datetimeFigureOut">
               <a:rPr lang="en-US"/>
-              <a:t>6/5/2015</a:t>
+              <a:t>6/19/15</a:t>
             </a:fld>
             <a:endParaRPr lang="en-US"/>
           </a:p>
@@ -27981,7 +28614,7 @@
         <p:spPr>
           <a:xfrm>
             <a:off x="787400" y="1922306"/>
-            <a:ext cx="8742045" cy="5283200"/>
+            <a:ext cx="9779000" cy="5380960"/>
           </a:xfrm>
           <a:prstGeom prst="rect">
             <a:avLst/>
@@ -28020,76 +28653,34 @@
               <a:t> </a:t>
             </a:r>
             <a:r>
-              <a:rPr sz="4800" dirty="0">
-                <a:latin typeface="Arial"/>
-                <a:cs typeface="Arial"/>
-              </a:rPr>
-              <a:t>corre</a:t>
-            </a:r>
-            <a:r>
-              <a:rPr sz="4800" spc="-5" dirty="0">
-                <a:latin typeface="Arial"/>
-                <a:cs typeface="Arial"/>
-              </a:rPr>
-              <a:t>c</a:t>
-            </a:r>
-            <a:r>
-              <a:rPr sz="4800" spc="-10" dirty="0">
+              <a:rPr lang="en-US" sz="4800" dirty="0" smtClean="0">
+                <a:latin typeface="Arial"/>
+                <a:cs typeface="Arial"/>
+              </a:rPr>
+              <a:t>lint testing </a:t>
+            </a:r>
+            <a:r>
+              <a:rPr sz="4800" spc="-10" dirty="0" smtClean="0">
                 <a:latin typeface="Arial"/>
                 <a:cs typeface="Arial"/>
               </a:rPr>
               <a:t>t</a:t>
             </a:r>
             <a:r>
-              <a:rPr sz="4800" dirty="0">
-                <a:latin typeface="Arial"/>
-                <a:cs typeface="Arial"/>
-              </a:rPr>
-              <a:t>ness-checking</a:t>
-            </a:r>
-            <a:r>
-              <a:rPr sz="4800" spc="-5" dirty="0">
-                <a:latin typeface="Arial"/>
-                <a:cs typeface="Arial"/>
-              </a:rPr>
-              <a:t> </a:t>
-            </a:r>
-            <a:r>
-              <a:rPr sz="4800" spc="-10" dirty="0">
-                <a:latin typeface="Arial"/>
-                <a:cs typeface="Arial"/>
-              </a:rPr>
-              <a:t>t</a:t>
-            </a:r>
-            <a:r>
-              <a:rPr sz="4800" dirty="0">
+              <a:rPr sz="4800" dirty="0" smtClean="0">
                 <a:latin typeface="Arial"/>
                 <a:cs typeface="Arial"/>
               </a:rPr>
               <a:t>ool</a:t>
             </a:r>
             <a:r>
-              <a:rPr sz="4800" spc="-5" dirty="0">
-                <a:latin typeface="Arial"/>
-                <a:cs typeface="Arial"/>
-              </a:rPr>
-              <a:t> </a:t>
-            </a:r>
-            <a:r>
-              <a:rPr sz="4800" spc="-10" dirty="0">
-                <a:latin typeface="Arial"/>
-                <a:cs typeface="Arial"/>
-              </a:rPr>
-              <a:t>f</a:t>
-            </a:r>
-            <a:r>
-              <a:rPr sz="4800" dirty="0">
-                <a:latin typeface="Arial"/>
-                <a:cs typeface="Arial"/>
-              </a:rPr>
-              <a:t>or cookbooks</a:t>
-            </a:r>
-            <a:endParaRPr sz="4800">
+              <a:rPr lang="en-US" sz="4800" dirty="0" smtClean="0">
+                <a:latin typeface="Arial"/>
+                <a:cs typeface="Arial"/>
+              </a:rPr>
+              <a:t>, or correctness checker</a:t>
+            </a:r>
+            <a:endParaRPr sz="4800" dirty="0">
               <a:latin typeface="Arial"/>
               <a:cs typeface="Arial"/>
             </a:endParaRPr>
@@ -28111,11 +28702,46 @@
               </a:tabLst>
             </a:pPr>
             <a:r>
+              <a:rPr lang="en-US" sz="4800" dirty="0" smtClean="0">
+                <a:latin typeface="Arial"/>
+                <a:cs typeface="Arial"/>
+              </a:rPr>
+              <a:t>Ensure you adhere to</a:t>
+            </a:r>
+            <a:r>
+              <a:rPr sz="4800" spc="-5" dirty="0" smtClean="0">
+                <a:latin typeface="Arial"/>
+                <a:cs typeface="Arial"/>
+              </a:rPr>
+              <a:t> </a:t>
+            </a:r>
+            <a:r>
               <a:rPr sz="4800" dirty="0">
                 <a:latin typeface="Arial"/>
                 <a:cs typeface="Arial"/>
               </a:rPr>
-              <a:t>Communi</a:t>
+              <a:t>be</a:t>
+            </a:r>
+            <a:r>
+              <a:rPr sz="4800" spc="-5" dirty="0">
+                <a:latin typeface="Arial"/>
+                <a:cs typeface="Arial"/>
+              </a:rPr>
+              <a:t>st </a:t>
+            </a:r>
+            <a:r>
+              <a:rPr sz="4800" dirty="0">
+                <a:latin typeface="Arial"/>
+                <a:cs typeface="Arial"/>
+              </a:rPr>
+              <a:t>pra</a:t>
+            </a:r>
+            <a:r>
+              <a:rPr sz="4800" spc="-5" dirty="0">
+                <a:latin typeface="Arial"/>
+                <a:cs typeface="Arial"/>
+              </a:rPr>
+              <a:t>c</a:t>
             </a:r>
             <a:r>
               <a:rPr sz="4800" spc="-10" dirty="0">
@@ -28129,7 +28755,7 @@
                 <a:latin typeface="Arial"/>
                 <a:cs typeface="Arial"/>
               </a:rPr>
-              <a:t>y</a:t>
+              <a:t>ices</a:t>
             </a:r>
             <a:r>
               <a:rPr sz="4800" spc="-5" dirty="0">
@@ -28139,93 +28765,40 @@
               <a:t> </a:t>
             </a:r>
             <a:r>
+              <a:rPr sz="4800" spc="-10" dirty="0">
+                <a:latin typeface="Arial"/>
+                <a:cs typeface="Arial"/>
+              </a:rPr>
+              <a:t>f</a:t>
+            </a:r>
+            <a:r>
               <a:rPr sz="4800" dirty="0">
                 <a:latin typeface="Arial"/>
                 <a:cs typeface="Arial"/>
               </a:rPr>
-              <a:t>be</a:t>
+              <a:t>or cookbook</a:t>
             </a:r>
             <a:r>
               <a:rPr sz="4800" spc="-5" dirty="0">
                 <a:latin typeface="Arial"/>
                 <a:cs typeface="Arial"/>
               </a:rPr>
-              <a:t>st </a:t>
+              <a:t> s</a:t>
+            </a:r>
+            <a:r>
+              <a:rPr sz="4800" spc="-10" dirty="0">
+                <a:latin typeface="Arial"/>
+                <a:cs typeface="Arial"/>
+              </a:rPr>
+              <a:t>t</a:t>
             </a:r>
             <a:r>
               <a:rPr sz="4800" dirty="0">
                 <a:latin typeface="Arial"/>
                 <a:cs typeface="Arial"/>
               </a:rPr>
-              <a:t>pra</a:t>
-            </a:r>
-            <a:r>
-              <a:rPr sz="4800" spc="-5" dirty="0">
-                <a:latin typeface="Arial"/>
-                <a:cs typeface="Arial"/>
-              </a:rPr>
-              <a:t>c</a:t>
-            </a:r>
-            <a:r>
-              <a:rPr sz="4800" spc="-10" dirty="0">
-                <a:latin typeface="Arial"/>
-                <a:cs typeface="Arial"/>
-              </a:rPr>
-              <a:t>t</a:t>
-            </a:r>
-            <a:r>
-              <a:rPr sz="4800" dirty="0">
-                <a:latin typeface="Arial"/>
-                <a:cs typeface="Arial"/>
-              </a:rPr>
-              <a:t>ices</a:t>
-            </a:r>
-            <a:r>
-              <a:rPr sz="4800" spc="-5" dirty="0">
-                <a:latin typeface="Arial"/>
-                <a:cs typeface="Arial"/>
-              </a:rPr>
-              <a:t> </a:t>
-            </a:r>
-            <a:r>
-              <a:rPr sz="4800" spc="-10" dirty="0">
-                <a:latin typeface="Arial"/>
-                <a:cs typeface="Arial"/>
-              </a:rPr>
-              <a:t>f</a:t>
-            </a:r>
-            <a:r>
-              <a:rPr sz="4800" dirty="0">
-                <a:latin typeface="Arial"/>
-                <a:cs typeface="Arial"/>
-              </a:rPr>
-              <a:t>or cookbook</a:t>
-            </a:r>
-            <a:r>
-              <a:rPr sz="4800" spc="-5" dirty="0">
-                <a:latin typeface="Arial"/>
-                <a:cs typeface="Arial"/>
-              </a:rPr>
-              <a:t> s</a:t>
-            </a:r>
-            <a:r>
-              <a:rPr sz="4800" spc="-10" dirty="0">
-                <a:latin typeface="Arial"/>
-                <a:cs typeface="Arial"/>
-              </a:rPr>
-              <a:t>t</a:t>
-            </a:r>
-            <a:r>
-              <a:rPr sz="4800" dirty="0">
-                <a:latin typeface="Arial"/>
-                <a:cs typeface="Arial"/>
-              </a:rPr>
               <a:t>yle</a:t>
             </a:r>
-            <a:endParaRPr sz="4800">
-              <a:latin typeface="Arial"/>
-              <a:cs typeface="Arial"/>
-            </a:endParaRPr>
           </a:p>
           <a:p>
             <a:pPr marL="393700" marR="106680" indent="-381000">
@@ -28376,10 +28949,6 @@
               </a:rPr>
               <a:t>om rules</a:t>
             </a:r>
-            <a:endParaRPr sz="4800">
-              <a:latin typeface="Arial"/>
-              <a:cs typeface="Arial"/>
-            </a:endParaRPr>
           </a:p>
           <a:p>
             <a:pPr marL="393700" indent="-381000">
@@ -28401,7 +28970,7 @@
               <a:rPr sz="4800" u="heavy" dirty="0">
                 <a:latin typeface="Arial"/>
                 <a:cs typeface="Arial"/>
-                <a:hlinkClick r:id="rId2"/>
+                <a:hlinkClick r:id="rId3"/>
               </a:rPr>
               <a:t>h</a:t>
             </a:r>
@@ -28409,7 +28978,7 @@
               <a:rPr sz="4800" u="heavy" spc="-10" dirty="0">
                 <a:latin typeface="Arial"/>
                 <a:cs typeface="Arial"/>
-                <a:hlinkClick r:id="rId2"/>
+                <a:hlinkClick r:id="rId3"/>
               </a:rPr>
               <a:t>tt</a:t>
             </a:r>
@@ -28417,7 +28986,7 @@
               <a:rPr sz="4800" u="heavy" dirty="0">
                 <a:latin typeface="Arial"/>
                 <a:cs typeface="Arial"/>
-                <a:hlinkClick r:id="rId2"/>
+                <a:hlinkClick r:id="rId3"/>
               </a:rPr>
               <a:t>p</a:t>
             </a:r>
@@ -28425,7 +28994,7 @@
               <a:rPr sz="4800" u="heavy" spc="-10" dirty="0">
                 <a:latin typeface="Arial"/>
                 <a:cs typeface="Arial"/>
-                <a:hlinkClick r:id="rId2"/>
+                <a:hlinkClick r:id="rId3"/>
               </a:rPr>
               <a:t>://f</a:t>
             </a:r>
@@ -28433,7 +29002,7 @@
               <a:rPr sz="4800" u="heavy" dirty="0">
                 <a:latin typeface="Arial"/>
                 <a:cs typeface="Arial"/>
-                <a:hlinkClick r:id="rId2"/>
+                <a:hlinkClick r:id="rId3"/>
               </a:rPr>
               <a:t>oodcri</a:t>
             </a:r>
@@ -28441,7 +29010,7 @@
               <a:rPr sz="4800" u="heavy" spc="-10" dirty="0">
                 <a:latin typeface="Arial"/>
                 <a:cs typeface="Arial"/>
-                <a:hlinkClick r:id="rId2"/>
+                <a:hlinkClick r:id="rId3"/>
               </a:rPr>
               <a:t>t</a:t>
             </a:r>
@@ -28449,7 +29018,7 @@
               <a:rPr sz="4800" u="heavy" dirty="0">
                 <a:latin typeface="Arial"/>
                 <a:cs typeface="Arial"/>
-                <a:hlinkClick r:id="rId2"/>
+                <a:hlinkClick r:id="rId3"/>
               </a:rPr>
               <a:t>i</a:t>
             </a:r>
@@ -28457,7 +29026,7 @@
               <a:rPr sz="4800" u="heavy" spc="-5" dirty="0">
                 <a:latin typeface="Arial"/>
                 <a:cs typeface="Arial"/>
-                <a:hlinkClick r:id="rId2"/>
+                <a:hlinkClick r:id="rId3"/>
               </a:rPr>
               <a:t>c</a:t>
             </a:r>
@@ -28465,7 +29034,7 @@
               <a:rPr sz="4800" u="heavy" spc="-10" dirty="0">
                 <a:latin typeface="Arial"/>
                 <a:cs typeface="Arial"/>
-                <a:hlinkClick r:id="rId2"/>
+                <a:hlinkClick r:id="rId3"/>
               </a:rPr>
               <a:t>.</a:t>
             </a:r>
@@ -28473,7 +29042,7 @@
               <a:rPr sz="4800" u="heavy" dirty="0">
                 <a:latin typeface="Arial"/>
                 <a:cs typeface="Arial"/>
-                <a:hlinkClick r:id="rId2"/>
+                <a:hlinkClick r:id="rId3"/>
               </a:rPr>
               <a:t>i</a:t>
             </a:r>
@@ -28481,7 +29050,7 @@
               <a:rPr sz="4800" u="heavy" spc="-5" dirty="0">
                 <a:latin typeface="Arial"/>
                 <a:cs typeface="Arial"/>
-                <a:hlinkClick r:id="rId2"/>
+                <a:hlinkClick r:id="rId3"/>
               </a:rPr>
               <a:t>o</a:t>
             </a:r>
@@ -28489,11 +29058,11 @@
               <a:rPr sz="4800" spc="-5" dirty="0">
                 <a:latin typeface="Arial"/>
                 <a:cs typeface="Arial"/>
-                <a:hlinkClick r:id="rId2"/>
+                <a:hlinkClick r:id="rId3"/>
               </a:rPr>
               <a:t>/</a:t>
             </a:r>
-            <a:endParaRPr sz="4800">
+            <a:endParaRPr sz="4800" dirty="0">
               <a:latin typeface="Arial"/>
               <a:cs typeface="Arial"/>
             </a:endParaRPr>
@@ -28515,7 +29084,7 @@
             <a:avLst/>
           </a:prstGeom>
           <a:blipFill>
-            <a:blip r:embed="rId3" cstate="print"/>
+            <a:blip r:embed="rId4" cstate="print"/>
             <a:stretch>
               <a:fillRect/>
             </a:stretch>
@@ -39169,7 +39738,7 @@
         <p:spPr>
           <a:xfrm>
             <a:off x="787400" y="1922306"/>
-            <a:ext cx="13808075" cy="3733800"/>
+            <a:ext cx="13808075" cy="4545261"/>
           </a:xfrm>
           <a:prstGeom prst="rect">
             <a:avLst/>
@@ -39439,51 +40008,40 @@
               <a:t> </a:t>
             </a:r>
             <a:r>
+              <a:rPr lang="en-US" sz="4800" spc="-10" dirty="0" smtClean="0">
+                <a:latin typeface="Arial"/>
+                <a:cs typeface="Arial"/>
+              </a:rPr>
+              <a:t>if they do</a:t>
+            </a:r>
+            <a:r>
+              <a:rPr sz="4800" spc="-5" dirty="0" smtClean="0">
+                <a:latin typeface="Arial"/>
+                <a:cs typeface="Arial"/>
+              </a:rPr>
+              <a:t> </a:t>
+            </a:r>
+            <a:r>
+              <a:rPr sz="4800" dirty="0">
+                <a:latin typeface="Arial"/>
+                <a:cs typeface="Arial"/>
+              </a:rPr>
+              <a:t>no</a:t>
+            </a:r>
+            <a:r>
               <a:rPr sz="4800" spc="-10" dirty="0">
                 <a:latin typeface="Arial"/>
                 <a:cs typeface="Arial"/>
               </a:rPr>
-              <a:t>f</a:t>
+              <a:t>t</a:t>
             </a:r>
             <a:r>
               <a:rPr sz="4800" dirty="0">
                 <a:latin typeface="Arial"/>
                 <a:cs typeface="Arial"/>
               </a:rPr>
-              <a:t>or</a:t>
-            </a:r>
-            <a:r>
-              <a:rPr sz="4800" spc="-5" dirty="0">
-                <a:latin typeface="Arial"/>
-                <a:cs typeface="Arial"/>
-              </a:rPr>
-              <a:t> </a:t>
-            </a:r>
-            <a:r>
-              <a:rPr sz="4800" dirty="0">
-                <a:latin typeface="Arial"/>
-                <a:cs typeface="Arial"/>
-              </a:rPr>
-              <a:t>no</a:t>
-            </a:r>
-            <a:r>
-              <a:rPr sz="4800" spc="-10" dirty="0">
-                <a:latin typeface="Arial"/>
-                <a:cs typeface="Arial"/>
-              </a:rPr>
-              <a:t>t</a:t>
-            </a:r>
-            <a:r>
-              <a:rPr sz="4800" dirty="0">
-                <a:latin typeface="Arial"/>
-                <a:cs typeface="Arial"/>
-              </a:rPr>
               <a:t>)</a:t>
             </a:r>
-            <a:endParaRPr sz="4800">
-              <a:latin typeface="Arial"/>
-              <a:cs typeface="Arial"/>
-            </a:endParaRPr>
           </a:p>
           <a:p>
             <a:pPr marL="393700" indent="-381000">
@@ -39593,13 +40151,20 @@
               <a:t> </a:t>
             </a:r>
             <a:r>
-              <a:rPr sz="4800" dirty="0">
+              <a:rPr sz="4800" dirty="0" smtClean="0">
                 <a:latin typeface="Arial"/>
                 <a:cs typeface="Arial"/>
               </a:rPr>
               <a:t>rules</a:t>
             </a:r>
-            <a:endParaRPr sz="4800">
+            <a:r>
+              <a:rPr lang="en-US" sz="4800" dirty="0" smtClean="0">
+                <a:latin typeface="Arial"/>
+                <a:cs typeface="Arial"/>
+              </a:rPr>
+              <a:t>.</a:t>
+            </a:r>
+            <a:endParaRPr sz="4800" dirty="0">
               <a:latin typeface="Arial"/>
               <a:cs typeface="Arial"/>
             </a:endParaRPr>
@@ -39870,7 +40435,7 @@
               </a:rPr>
               <a:t>ra-rules</a:t>
             </a:r>
-            <a:endParaRPr sz="4800">
+            <a:endParaRPr sz="4800" dirty="0">
               <a:latin typeface="Arial"/>
               <a:cs typeface="Arial"/>
             </a:endParaRPr>
@@ -44218,7 +44783,7 @@
         <p:spPr>
           <a:xfrm>
             <a:off x="800100" y="1955800"/>
-            <a:ext cx="14655800" cy="1028700"/>
+            <a:ext cx="14655800" cy="553998"/>
           </a:xfrm>
           <a:prstGeom prst="rect">
             <a:avLst/>
@@ -44254,6 +44819,26 @@
               <a:t>$ </a:t>
             </a:r>
             <a:r>
+              <a:rPr sz="3600" spc="-5" dirty="0" smtClean="0">
+                <a:solidFill>
+                  <a:srgbClr val="FFFFFF"/>
+                </a:solidFill>
+                <a:latin typeface="Courier New"/>
+                <a:cs typeface="Courier New"/>
+              </a:rPr>
+              <a:t>ge</a:t>
+            </a:r>
+            <a:r>
+              <a:rPr sz="3600" dirty="0" smtClean="0">
+                <a:solidFill>
+                  <a:srgbClr val="FFFFFF"/>
+                </a:solidFill>
+                <a:latin typeface="Courier New"/>
+                <a:cs typeface="Courier New"/>
+              </a:rPr>
+              <a:t>m </a:t>
+            </a:r>
+            <a:r>
               <a:rPr sz="3600" spc="-5" dirty="0">
                 <a:solidFill>
                   <a:srgbClr val="FFFFFF"/>
@@ -44261,7 +44846,7 @@
                 <a:latin typeface="Courier New"/>
                 <a:cs typeface="Courier New"/>
               </a:rPr>
-              <a:t>ge</a:t>
+              <a:t>instal</a:t>
             </a:r>
             <a:r>
               <a:rPr sz="3600" dirty="0">
@@ -44271,7 +44856,7 @@
                 <a:latin typeface="Courier New"/>
                 <a:cs typeface="Courier New"/>
               </a:rPr>
-              <a:t>m </a:t>
+              <a:t>l </a:t>
             </a:r>
             <a:r>
               <a:rPr sz="3600" spc="-5" dirty="0">
@@ -44281,7 +44866,7 @@
                 <a:latin typeface="Courier New"/>
                 <a:cs typeface="Courier New"/>
               </a:rPr>
-              <a:t>instal</a:t>
+              <a:t>foodcriti</a:t>
             </a:r>
             <a:r>
               <a:rPr sz="3600" dirty="0">
@@ -44291,7 +44876,7 @@
                 <a:latin typeface="Courier New"/>
                 <a:cs typeface="Courier New"/>
               </a:rPr>
-              <a:t>l </a:t>
+              <a:t>c </a:t>
             </a:r>
             <a:r>
               <a:rPr sz="3600" spc="-5" dirty="0">
@@ -44301,7 +44886,7 @@
                 <a:latin typeface="Courier New"/>
                 <a:cs typeface="Courier New"/>
               </a:rPr>
-              <a:t>foodcriti</a:t>
+              <a:t>--no-r</a:t>
             </a:r>
             <a:r>
               <a:rPr sz="3600" dirty="0">
@@ -44311,7 +44896,7 @@
                 <a:latin typeface="Courier New"/>
                 <a:cs typeface="Courier New"/>
               </a:rPr>
-              <a:t>c </a:t>
+              <a:t>i </a:t>
             </a:r>
             <a:r>
               <a:rPr sz="3600" spc="-5" dirty="0">
@@ -44321,59 +44906,29 @@
                 <a:latin typeface="Courier New"/>
                 <a:cs typeface="Courier New"/>
               </a:rPr>
-              <a:t>--no-r</a:t>
-            </a:r>
-            <a:r>
-              <a:rPr sz="3600" dirty="0">
+              <a:t>--no-</a:t>
+            </a:r>
+            <a:r>
+              <a:rPr sz="3600" spc="-5" dirty="0" smtClean="0">
                 <a:solidFill>
                   <a:srgbClr val="FFFFFF"/>
                 </a:solidFill>
                 <a:latin typeface="Courier New"/>
                 <a:cs typeface="Courier New"/>
               </a:rPr>
-              <a:t>i </a:t>
-            </a:r>
-            <a:r>
-              <a:rPr sz="3600" spc="-5" dirty="0">
+              <a:t>rdo</a:t>
+            </a:r>
+            <a:r>
+              <a:rPr sz="3600" dirty="0" smtClean="0">
                 <a:solidFill>
                   <a:srgbClr val="FFFFFF"/>
                 </a:solidFill>
                 <a:latin typeface="Courier New"/>
                 <a:cs typeface="Courier New"/>
               </a:rPr>
-              <a:t>--no-rdo</a:t>
-            </a:r>
-            <a:r>
-              <a:rPr sz="3600" dirty="0">
-                <a:solidFill>
-                  <a:srgbClr val="FFFFFF"/>
-                </a:solidFill>
-                <a:latin typeface="Courier New"/>
-                <a:cs typeface="Courier New"/>
-              </a:rPr>
-              <a:t>c </a:t>
-            </a:r>
-            <a:r>
-              <a:rPr sz="3600" spc="-5" dirty="0">
-                <a:solidFill>
-                  <a:srgbClr val="FFFFFF"/>
-                </a:solidFill>
-                <a:latin typeface="Courier New"/>
-                <a:cs typeface="Courier New"/>
-              </a:rPr>
-              <a:t>-</a:t>
-            </a:r>
-            <a:r>
-              <a:rPr sz="3600" dirty="0">
-                <a:solidFill>
-                  <a:srgbClr val="FFFFFF"/>
-                </a:solidFill>
-                <a:latin typeface="Courier New"/>
-                <a:cs typeface="Courier New"/>
-              </a:rPr>
-              <a:t>v 3.0.3</a:t>
-            </a:r>
-            <a:endParaRPr sz="3600">
+              <a:t>c</a:t>
+            </a:r>
+            <a:endParaRPr sz="3600" dirty="0">
               <a:latin typeface="Courier New"/>
               <a:cs typeface="Courier New"/>
             </a:endParaRPr>
@@ -44473,8 +45028,8 @@
         </p:nvSpPr>
         <p:spPr>
           <a:xfrm>
-            <a:off x="800100" y="3467100"/>
-            <a:ext cx="14655800" cy="5143500"/>
+            <a:off x="800100" y="3429000"/>
+            <a:ext cx="14655800" cy="5181600"/>
           </a:xfrm>
           <a:custGeom>
             <a:avLst/>
@@ -44694,7 +45249,7 @@
               </a:rPr>
               <a:t>d foodcritic-3.0.3</a:t>
             </a:r>
-            <a:endParaRPr sz="3600">
+            <a:endParaRPr sz="3600" dirty="0">
               <a:latin typeface="Courier New"/>
               <a:cs typeface="Courier New"/>
             </a:endParaRPr>
@@ -44735,7 +45290,7 @@
               </a:rPr>
               <a:t>m installed</a:t>
             </a:r>
-            <a:endParaRPr sz="3600">
+            <a:endParaRPr sz="3600" dirty="0">
               <a:latin typeface="Courier New"/>
               <a:cs typeface="Courier New"/>
             </a:endParaRPr>
@@ -50648,4 +51203,324 @@
   <a:objectDefaults/>
   <a:extraClrSchemeLst/>
 </a:theme>
+</file>
+
+<file path=ppt/theme/theme2.xml><?xml version="1.0" encoding="utf-8"?>
+<a:theme xmlns:a="http://schemas.openxmlformats.org/drawingml/2006/main" name="Office Theme">
+  <a:themeElements>
+    <a:clrScheme name="Office">
+      <a:dk1>
+        <a:sysClr val="windowText" lastClr="000000"/>
+      </a:dk1>
+      <a:lt1>
+        <a:sysClr val="window" lastClr="FFFFFF"/>
+      </a:lt1>
+      <a:dk2>
+        <a:srgbClr val="1F497D"/>
+      </a:dk2>
+      <a:lt2>
+        <a:srgbClr val="EEECE1"/>
+      </a:lt2>
+      <a:accent1>
+        <a:srgbClr val="4F81BD"/>
+      </a:accent1>
+      <a:accent2>
+        <a:srgbClr val="C0504D"/>
+      </a:accent2>
+      <a:accent3>
+        <a:srgbClr val="9BBB59"/>
+      </a:accent3>
+      <a:accent4>
+        <a:srgbClr val="8064A2"/>
+      </a:accent4>
+      <a:accent5>
+        <a:srgbClr val="4BACC6"/>
+      </a:accent5>
+      <a:accent6>
+        <a:srgbClr val="F79646"/>
+      </a:accent6>
+      <a:hlink>
+        <a:srgbClr val="0000FF"/>
+      </a:hlink>
+      <a:folHlink>
+        <a:srgbClr val="800080"/>
+      </a:folHlink>
+    </a:clrScheme>
+    <a:fontScheme name="Office">
+      <a:majorFont>
+        <a:latin typeface="Calibri"/>
+        <a:ea typeface=""/>
+        <a:cs typeface=""/>
+        <a:font script="Jpan" typeface="ＭＳ Ｐゴシック"/>
+        <a:font script="Hang" typeface="맑은 고딕"/>
+        <a:font script="Hans" typeface="宋体"/>
+        <a:font script="Hant" typeface="新細明體"/>
+        <a:font script="Arab" typeface="Times New Roman"/>
+        <a:font script="Hebr" typeface="Times New Roman"/>
+        <a:font script="Thai" typeface="Angsana New"/>
+        <a:font script="Ethi" typeface="Nyala"/>
+        <a:font script="Beng" typeface="Vrinda"/>
+        <a:font script="Gujr" typeface="Shruti"/>
+        <a:font script="Khmr" typeface="MoolBoran"/>
+        <a:font script="Knda" typeface="Tunga"/>
+        <a:font script="Guru" typeface="Raavi"/>
+        <a:font script="Cans" typeface="Euphemia"/>
+        <a:font script="Cher" typeface="Plantagenet Cherokee"/>
+        <a:font script="Yiii" typeface="Microsoft Yi Baiti"/>
+        <a:font script="Tibt" typeface="Microsoft Himalaya"/>
+        <a:font script="Thaa" typeface="MV Boli"/>
+        <a:font script="Deva" typeface="Mangal"/>
+        <a:font script="Telu" typeface="Gautami"/>
+        <a:font script="Taml" typeface="Latha"/>
+        <a:font script="Syrc" typeface="Estrangelo Edessa"/>
+        <a:font script="Orya" typeface="Kalinga"/>
+        <a:font script="Mlym" typeface="Kartika"/>
+        <a:font script="Laoo" typeface="DokChampa"/>
+        <a:font script="Sinh" typeface="Iskoola Pota"/>
+        <a:font script="Mong" typeface="Mongolian Baiti"/>
+        <a:font script="Viet" typeface="Times New Roman"/>
+        <a:font script="Uigh" typeface="Microsoft Uighur"/>
+        <a:font script="Geor" typeface="Sylfaen"/>
+      </a:majorFont>
+      <a:minorFont>
+        <a:latin typeface="Calibri"/>
+        <a:ea typeface=""/>
+        <a:cs typeface=""/>
+        <a:font script="Jpan" typeface="ＭＳ Ｐゴシック"/>
+        <a:font script="Hang" typeface="맑은 고딕"/>
+        <a:font script="Hans" typeface="宋体"/>
+        <a:font script="Hant" typeface="新細明體"/>
+        <a:font script="Arab" typeface="Arial"/>
+        <a:font script="Hebr" typeface="Arial"/>
+        <a:font script="Thai" typeface="Cordia New"/>
+        <a:font script="Ethi" typeface="Nyala"/>
+        <a:font script="Beng" typeface="Vrinda"/>
+        <a:font script="Gujr" typeface="Shruti"/>
+        <a:font script="Khmr" typeface="DaunPenh"/>
+        <a:font script="Knda" typeface="Tunga"/>
+        <a:font script="Guru" typeface="Raavi"/>
+        <a:font script="Cans" typeface="Euphemia"/>
+        <a:font script="Cher" typeface="Plantagenet Cherokee"/>
+        <a:font script="Yiii" typeface="Microsoft Yi Baiti"/>
+        <a:font script="Tibt" typeface="Microsoft Himalaya"/>
+        <a:font script="Thaa" typeface="MV Boli"/>
+        <a:font script="Deva" typeface="Mangal"/>
+        <a:font script="Telu" typeface="Gautami"/>
+        <a:font script="Taml" typeface="Latha"/>
+        <a:font script="Syrc" typeface="Estrangelo Edessa"/>
+        <a:font script="Orya" typeface="Kalinga"/>
+        <a:font script="Mlym" typeface="Kartika"/>
+        <a:font script="Laoo" typeface="DokChampa"/>
+        <a:font script="Sinh" typeface="Iskoola Pota"/>
+        <a:font script="Mong" typeface="Mongolian Baiti"/>
+        <a:font script="Viet" typeface="Arial"/>
+        <a:font script="Uigh" typeface="Microsoft Uighur"/>
+        <a:font script="Geor" typeface="Sylfaen"/>
+      </a:minorFont>
+    </a:fontScheme>
+    <a:fmtScheme name="Office">
+      <a:fillStyleLst>
+        <a:solidFill>
+          <a:schemeClr val="phClr"/>
+        </a:solidFill>
+        <a:gradFill rotWithShape="1">
+          <a:gsLst>
+            <a:gs pos="0">
+              <a:schemeClr val="phClr">
+                <a:tint val="50000"/>
+                <a:satMod val="300000"/>
+              </a:schemeClr>
+            </a:gs>
+            <a:gs pos="35000">
+              <a:schemeClr val="phClr">
+                <a:tint val="37000"/>
+                <a:satMod val="300000"/>
+              </a:schemeClr>
+            </a:gs>
+            <a:gs pos="100000">
+              <a:schemeClr val="phClr">
+                <a:tint val="15000"/>
+                <a:satMod val="350000"/>
+              </a:schemeClr>
+            </a:gs>
+          </a:gsLst>
+          <a:lin ang="16200000" scaled="1"/>
+        </a:gradFill>
+        <a:gradFill rotWithShape="1">
+          <a:gsLst>
+            <a:gs pos="0">
+              <a:schemeClr val="phClr">
+                <a:tint val="100000"/>
+                <a:shade val="100000"/>
+                <a:satMod val="130000"/>
+              </a:schemeClr>
+            </a:gs>
+            <a:gs pos="100000">
+              <a:schemeClr val="phClr">
+                <a:tint val="50000"/>
+                <a:shade val="100000"/>
+                <a:satMod val="350000"/>
+              </a:schemeClr>
+            </a:gs>
+          </a:gsLst>
+          <a:lin ang="16200000" scaled="0"/>
+        </a:gradFill>
+      </a:fillStyleLst>
+      <a:lnStyleLst>
+        <a:ln w="9525" cap="flat" cmpd="sng" algn="ctr">
+          <a:solidFill>
+            <a:schemeClr val="phClr">
+              <a:shade val="95000"/>
+              <a:satMod val="105000"/>
+            </a:schemeClr>
+          </a:solidFill>
+          <a:prstDash val="solid"/>
+        </a:ln>
+        <a:ln w="25400" cap="flat" cmpd="sng" algn="ctr">
+          <a:solidFill>
+            <a:schemeClr val="phClr"/>
+          </a:solidFill>
+          <a:prstDash val="solid"/>
+        </a:ln>
+        <a:ln w="38100" cap="flat" cmpd="sng" algn="ctr">
+          <a:solidFill>
+            <a:schemeClr val="phClr"/>
+          </a:solidFill>
+          <a:prstDash val="solid"/>
+        </a:ln>
+      </a:lnStyleLst>
+      <a:effectStyleLst>
+        <a:effectStyle>
+          <a:effectLst>
+            <a:outerShdw blurRad="40000" dist="20000" dir="5400000" rotWithShape="0">
+              <a:srgbClr val="000000">
+                <a:alpha val="38000"/>
+              </a:srgbClr>
+            </a:outerShdw>
+          </a:effectLst>
+        </a:effectStyle>
+        <a:effectStyle>
+          <a:effectLst>
+            <a:outerShdw blurRad="40000" dist="23000" dir="5400000" rotWithShape="0">
+              <a:srgbClr val="000000">
+                <a:alpha val="35000"/>
+              </a:srgbClr>
+            </a:outerShdw>
+          </a:effectLst>
+        </a:effectStyle>
+        <a:effectStyle>
+          <a:effectLst>
+            <a:outerShdw blurRad="40000" dist="23000" dir="5400000" rotWithShape="0">
+              <a:srgbClr val="000000">
+                <a:alpha val="35000"/>
+              </a:srgbClr>
+            </a:outerShdw>
+          </a:effectLst>
+          <a:scene3d>
+            <a:camera prst="orthographicFront">
+              <a:rot lat="0" lon="0" rev="0"/>
+            </a:camera>
+            <a:lightRig rig="threePt" dir="t">
+              <a:rot lat="0" lon="0" rev="1200000"/>
+            </a:lightRig>
+          </a:scene3d>
+          <a:sp3d>
+            <a:bevelT w="63500" h="25400"/>
+          </a:sp3d>
+        </a:effectStyle>
+      </a:effectStyleLst>
+      <a:bgFillStyleLst>
+        <a:solidFill>
+          <a:schemeClr val="phClr"/>
+        </a:solidFill>
+        <a:gradFill rotWithShape="1">
+          <a:gsLst>
+            <a:gs pos="0">
+              <a:schemeClr val="phClr">
+                <a:tint val="40000"/>
+                <a:satMod val="350000"/>
+              </a:schemeClr>
+            </a:gs>
+            <a:gs pos="40000">
+              <a:schemeClr val="phClr">
+                <a:tint val="45000"/>
+                <a:shade val="99000"/>
+                <a:satMod val="350000"/>
+              </a:schemeClr>
+            </a:gs>
+            <a:gs pos="100000">
+              <a:schemeClr val="phClr">
+                <a:shade val="20000"/>
+                <a:satMod val="255000"/>
+              </a:schemeClr>
+            </a:gs>
+          </a:gsLst>
+          <a:path path="circle">
+            <a:fillToRect l="50000" t="-80000" r="50000" b="180000"/>
+          </a:path>
+        </a:gradFill>
+        <a:gradFill rotWithShape="1">
+          <a:gsLst>
+            <a:gs pos="0">
+              <a:schemeClr val="phClr">
+                <a:tint val="80000"/>
+                <a:satMod val="300000"/>
+              </a:schemeClr>
+            </a:gs>
+            <a:gs pos="100000">
+              <a:schemeClr val="phClr">
+                <a:shade val="30000"/>
+                <a:satMod val="200000"/>
+              </a:schemeClr>
+            </a:gs>
+          </a:gsLst>
+          <a:path path="circle">
+            <a:fillToRect l="50000" t="50000" r="50000" b="50000"/>
+          </a:path>
+        </a:gradFill>
+      </a:bgFillStyleLst>
+    </a:fmtScheme>
+  </a:themeElements>
+  <a:objectDefaults>
+    <a:spDef>
+      <a:spPr/>
+      <a:bodyPr/>
+      <a:lstStyle/>
+      <a:style>
+        <a:lnRef idx="1">
+          <a:schemeClr val="accent1"/>
+        </a:lnRef>
+        <a:fillRef idx="3">
+          <a:schemeClr val="accent1"/>
+        </a:fillRef>
+        <a:effectRef idx="2">
+          <a:schemeClr val="accent1"/>
+        </a:effectRef>
+        <a:fontRef idx="minor">
+          <a:schemeClr val="lt1"/>
+        </a:fontRef>
+      </a:style>
+    </a:spDef>
+    <a:lnDef>
+      <a:spPr/>
+      <a:bodyPr/>
+      <a:lstStyle/>
+      <a:style>
+        <a:lnRef idx="2">
+          <a:schemeClr val="accent1"/>
+        </a:lnRef>
+        <a:fillRef idx="0">
+          <a:schemeClr val="accent1"/>
+        </a:fillRef>
+        <a:effectRef idx="1">
+          <a:schemeClr val="accent1"/>
+        </a:effectRef>
+        <a:fontRef idx="minor">
+          <a:schemeClr val="tx1"/>
+        </a:fontRef>
+      </a:style>
+    </a:lnDef>
+  </a:objectDefaults>
+  <a:extraClrSchemeLst/>
+</a:theme>
 </file>
</xml_diff>